<commit_message>
seperate training and validation set
</commit_message>
<xml_diff>
--- a/presentation.pptx
+++ b/presentation.pptx
@@ -14,8 +14,9 @@
     <p:sldId id="262" r:id="rId8"/>
     <p:sldId id="263" r:id="rId9"/>
     <p:sldId id="264" r:id="rId10"/>
-    <p:sldId id="265" r:id="rId11"/>
-    <p:sldId id="257" r:id="rId12"/>
+    <p:sldId id="269" r:id="rId11"/>
+    <p:sldId id="265" r:id="rId12"/>
+    <p:sldId id="257" r:id="rId13"/>
   </p:sldIdLst>
   <p:sldSz cx="12192000" cy="6858000"/>
   <p:notesSz cx="6858000" cy="9144000"/>
@@ -8390,6 +8391,692 @@
 <file path=ppt/slides/slide10.xml><?xml version="1.0" encoding="utf-8"?>
 <p:sld xmlns:a="http://schemas.openxmlformats.org/drawingml/2006/main" xmlns:r="http://schemas.openxmlformats.org/officeDocument/2006/relationships" xmlns:p="http://schemas.openxmlformats.org/presentationml/2006/main">
   <p:cSld>
+    <p:spTree>
+      <p:nvGrpSpPr>
+        <p:cNvPr id="1" name=""/>
+        <p:cNvGrpSpPr/>
+        <p:nvPr/>
+      </p:nvGrpSpPr>
+      <p:grpSpPr>
+        <a:xfrm>
+          <a:off x="0" y="0"/>
+          <a:ext cx="0" cy="0"/>
+          <a:chOff x="0" y="0"/>
+          <a:chExt cx="0" cy="0"/>
+        </a:xfrm>
+      </p:grpSpPr>
+      <p:sp>
+        <p:nvSpPr>
+          <p:cNvPr id="7" name="Rectangle 6"/>
+          <p:cNvSpPr>
+            <a:spLocks noGrp="1" noRot="1" noChangeAspect="1" noMove="1" noResize="1" noEditPoints="1" noAdjustHandles="1" noChangeArrowheads="1" noChangeShapeType="1" noTextEdit="1"/>
+          </p:cNvSpPr>
+          <p:nvPr/>
+        </p:nvSpPr>
+        <p:spPr>
+          <a:xfrm>
+            <a:off x="920834" y="1346946"/>
+            <a:ext cx="10222992" cy="80683"/>
+          </a:xfrm>
+          <a:prstGeom prst="rect">
+            <a:avLst/>
+          </a:prstGeom>
+          <a:blipFill dpi="0" rotWithShape="1">
+            <a:blip r:embed="rId2">
+              <a:alphaModFix amt="85000"/>
+              <a:lum bright="70000" contrast="-70000"/>
+              <a:extLst>
+                <a:ext uri="{BEBA8EAE-BF5A-486C-A8C5-ECC9F3942E4B}">
+                  <a14:imgProps xmlns:a14="http://schemas.microsoft.com/office/drawing/2010/main">
+                    <a14:imgLayer r:embed="rId3">
+                      <a14:imgEffect>
+                        <a14:sharpenSoften amount="61000"/>
+                      </a14:imgEffect>
+                    </a14:imgLayer>
+                  </a14:imgProps>
+                </a:ext>
+                <a:ext uri="{28A0092B-C50C-407E-A947-70E740481C1C}">
+                  <a14:useLocalDpi xmlns:a14="http://schemas.microsoft.com/office/drawing/2010/main" val="0"/>
+                </a:ext>
+              </a:extLst>
+            </a:blip>
+            <a:srcRect/>
+            <a:tile tx="0" ty="-762000" sx="92000" sy="89000" flip="xy" algn="ctr"/>
+          </a:blipFill>
+          <a:ln>
+            <a:noFill/>
+          </a:ln>
+        </p:spPr>
+        <p:style>
+          <a:lnRef idx="2">
+            <a:schemeClr val="accent1">
+              <a:shade val="50000"/>
+            </a:schemeClr>
+          </a:lnRef>
+          <a:fillRef idx="1">
+            <a:schemeClr val="accent1"/>
+          </a:fillRef>
+          <a:effectRef idx="0">
+            <a:schemeClr val="accent1"/>
+          </a:effectRef>
+          <a:fontRef idx="minor">
+            <a:schemeClr val="lt1"/>
+          </a:fontRef>
+        </p:style>
+      </p:sp>
+      <p:sp>
+        <p:nvSpPr>
+          <p:cNvPr id="9" name="Rectangle 8"/>
+          <p:cNvSpPr>
+            <a:spLocks noGrp="1" noRot="1" noChangeAspect="1" noMove="1" noResize="1" noEditPoints="1" noAdjustHandles="1" noChangeArrowheads="1" noChangeShapeType="1" noTextEdit="1"/>
+          </p:cNvSpPr>
+          <p:nvPr/>
+        </p:nvSpPr>
+        <p:spPr>
+          <a:xfrm>
+            <a:off x="920834" y="4299696"/>
+            <a:ext cx="10222992" cy="80683"/>
+          </a:xfrm>
+          <a:prstGeom prst="rect">
+            <a:avLst/>
+          </a:prstGeom>
+          <a:blipFill dpi="0" rotWithShape="1">
+            <a:blip r:embed="rId2">
+              <a:alphaModFix amt="85000"/>
+              <a:lum bright="70000" contrast="-70000"/>
+              <a:extLst>
+                <a:ext uri="{BEBA8EAE-BF5A-486C-A8C5-ECC9F3942E4B}">
+                  <a14:imgProps xmlns:a14="http://schemas.microsoft.com/office/drawing/2010/main">
+                    <a14:imgLayer r:embed="rId3">
+                      <a14:imgEffect>
+                        <a14:sharpenSoften amount="61000"/>
+                      </a14:imgEffect>
+                    </a14:imgLayer>
+                  </a14:imgProps>
+                </a:ext>
+                <a:ext uri="{28A0092B-C50C-407E-A947-70E740481C1C}">
+                  <a14:useLocalDpi xmlns:a14="http://schemas.microsoft.com/office/drawing/2010/main" val="0"/>
+                </a:ext>
+              </a:extLst>
+            </a:blip>
+            <a:srcRect/>
+            <a:tile tx="0" ty="-717550" sx="92000" sy="89000" flip="xy" algn="ctr"/>
+          </a:blipFill>
+          <a:ln>
+            <a:noFill/>
+          </a:ln>
+        </p:spPr>
+        <p:style>
+          <a:lnRef idx="2">
+            <a:schemeClr val="accent1">
+              <a:shade val="50000"/>
+            </a:schemeClr>
+          </a:lnRef>
+          <a:fillRef idx="1">
+            <a:schemeClr val="accent1"/>
+          </a:fillRef>
+          <a:effectRef idx="0">
+            <a:schemeClr val="accent1"/>
+          </a:effectRef>
+          <a:fontRef idx="minor">
+            <a:schemeClr val="lt1"/>
+          </a:fontRef>
+        </p:style>
+      </p:sp>
+      <p:sp>
+        <p:nvSpPr>
+          <p:cNvPr id="11" name="Rectangle 10"/>
+          <p:cNvSpPr>
+            <a:spLocks noGrp="1" noRot="1" noChangeAspect="1" noMove="1" noResize="1" noEditPoints="1" noAdjustHandles="1" noChangeArrowheads="1" noChangeShapeType="1" noTextEdit="1"/>
+          </p:cNvSpPr>
+          <p:nvPr/>
+        </p:nvSpPr>
+        <p:spPr>
+          <a:xfrm>
+            <a:off x="920834" y="1484779"/>
+            <a:ext cx="10222992" cy="2743200"/>
+          </a:xfrm>
+          <a:prstGeom prst="rect">
+            <a:avLst/>
+          </a:prstGeom>
+          <a:blipFill dpi="0" rotWithShape="1">
+            <a:blip r:embed="rId2">
+              <a:alphaModFix amt="85000"/>
+              <a:lum bright="70000" contrast="-70000"/>
+              <a:extLst>
+                <a:ext uri="{BEBA8EAE-BF5A-486C-A8C5-ECC9F3942E4B}">
+                  <a14:imgProps xmlns:a14="http://schemas.microsoft.com/office/drawing/2010/main">
+                    <a14:imgLayer r:embed="rId3">
+                      <a14:imgEffect>
+                        <a14:sharpenSoften amount="61000"/>
+                      </a14:imgEffect>
+                    </a14:imgLayer>
+                  </a14:imgProps>
+                </a:ext>
+                <a:ext uri="{28A0092B-C50C-407E-A947-70E740481C1C}">
+                  <a14:useLocalDpi xmlns:a14="http://schemas.microsoft.com/office/drawing/2010/main" val="0"/>
+                </a:ext>
+              </a:extLst>
+            </a:blip>
+            <a:srcRect/>
+            <a:tile tx="0" ty="-704850" sx="92000" sy="89000" flip="xy" algn="ctr"/>
+          </a:blipFill>
+          <a:ln>
+            <a:noFill/>
+          </a:ln>
+        </p:spPr>
+        <p:style>
+          <a:lnRef idx="2">
+            <a:schemeClr val="accent1">
+              <a:shade val="50000"/>
+            </a:schemeClr>
+          </a:lnRef>
+          <a:fillRef idx="1">
+            <a:schemeClr val="accent1"/>
+          </a:fillRef>
+          <a:effectRef idx="0">
+            <a:schemeClr val="accent1"/>
+          </a:effectRef>
+          <a:fontRef idx="minor">
+            <a:schemeClr val="lt1"/>
+          </a:fontRef>
+        </p:style>
+      </p:sp>
+      <p:grpSp>
+        <p:nvGrpSpPr>
+          <p:cNvPr id="13" name="Group 12"/>
+          <p:cNvGrpSpPr>
+            <a:grpSpLocks noGrp="1" noUngrp="1" noRot="1" noChangeAspect="1" noMove="1" noResize="1"/>
+          </p:cNvGrpSpPr>
+          <p:nvPr/>
+        </p:nvGrpSpPr>
+        <p:grpSpPr>
+          <a:xfrm>
+            <a:off x="9649215" y="4068923"/>
+            <a:ext cx="1080904" cy="1080902"/>
+            <a:chOff x="9685338" y="4460675"/>
+            <a:chExt cx="1080904" cy="1080902"/>
+          </a:xfrm>
+        </p:grpSpPr>
+        <p:sp>
+          <p:nvSpPr>
+            <p:cNvPr id="14" name="Oval 13"/>
+            <p:cNvSpPr/>
+            <p:nvPr/>
+          </p:nvSpPr>
+          <p:spPr>
+            <a:xfrm>
+              <a:off x="9685338" y="4460675"/>
+              <a:ext cx="1080904" cy="1080902"/>
+            </a:xfrm>
+            <a:prstGeom prst="ellipse">
+              <a:avLst/>
+            </a:prstGeom>
+            <a:blipFill dpi="0" rotWithShape="1">
+              <a:blip r:embed="rId4">
+                <a:duotone>
+                  <a:schemeClr val="accent1">
+                    <a:shade val="45000"/>
+                    <a:satMod val="135000"/>
+                  </a:schemeClr>
+                  <a:prstClr val="white"/>
+                </a:duotone>
+                <a:extLst>
+                  <a:ext uri="{BEBA8EAE-BF5A-486C-A8C5-ECC9F3942E4B}">
+                    <a14:imgProps xmlns:a14="http://schemas.microsoft.com/office/drawing/2010/main">
+                      <a14:imgLayer r:embed="rId5">
+                        <a14:imgEffect>
+                          <a14:saturation sat="95000"/>
+                        </a14:imgEffect>
+                      </a14:imgLayer>
+                    </a14:imgProps>
+                  </a:ext>
+                </a:extLst>
+              </a:blip>
+              <a:srcRect/>
+              <a:tile tx="0" ty="0" sx="85000" sy="85000" flip="none" algn="tl"/>
+            </a:blipFill>
+            <a:ln w="25400" cap="flat" cmpd="sng" algn="ctr">
+              <a:noFill/>
+              <a:prstDash val="solid"/>
+            </a:ln>
+            <a:effectLst/>
+          </p:spPr>
+        </p:sp>
+        <p:sp>
+          <p:nvSpPr>
+            <p:cNvPr id="15" name="Oval 14"/>
+            <p:cNvSpPr/>
+            <p:nvPr/>
+          </p:nvSpPr>
+          <p:spPr>
+            <a:xfrm>
+              <a:off x="9793429" y="4568765"/>
+              <a:ext cx="864723" cy="864722"/>
+            </a:xfrm>
+            <a:prstGeom prst="ellipse">
+              <a:avLst/>
+            </a:prstGeom>
+            <a:noFill/>
+            <a:ln w="25400" cap="flat" cmpd="sng" algn="ctr">
+              <a:solidFill>
+                <a:sysClr val="window" lastClr="FFFFFF"/>
+              </a:solidFill>
+              <a:prstDash val="solid"/>
+            </a:ln>
+            <a:effectLst/>
+          </p:spPr>
+        </p:sp>
+      </p:grpSp>
+      <p:sp useBgFill="1">
+        <p:nvSpPr>
+          <p:cNvPr id="17" name="Rectangle 16"/>
+          <p:cNvSpPr>
+            <a:spLocks noGrp="1" noRot="1" noChangeAspect="1" noMove="1" noResize="1" noEditPoints="1" noAdjustHandles="1" noChangeArrowheads="1" noChangeShapeType="1" noTextEdit="1"/>
+          </p:cNvSpPr>
+          <p:nvPr/>
+        </p:nvSpPr>
+        <p:spPr bwMode="white">
+          <a:xfrm>
+            <a:off x="0" y="0"/>
+            <a:ext cx="12188952" cy="6858001"/>
+          </a:xfrm>
+          <a:prstGeom prst="rect">
+            <a:avLst/>
+          </a:prstGeom>
+          <a:ln>
+            <a:noFill/>
+          </a:ln>
+        </p:spPr>
+        <p:style>
+          <a:lnRef idx="2">
+            <a:schemeClr val="accent1">
+              <a:shade val="50000"/>
+            </a:schemeClr>
+          </a:lnRef>
+          <a:fillRef idx="1">
+            <a:schemeClr val="accent1"/>
+          </a:fillRef>
+          <a:effectRef idx="0">
+            <a:schemeClr val="accent1"/>
+          </a:effectRef>
+          <a:fontRef idx="minor">
+            <a:schemeClr val="lt1"/>
+          </a:fontRef>
+        </p:style>
+        <p:txBody>
+          <a:bodyPr rot="0" spcFirstLastPara="0" vert="horz" wrap="square" lIns="91440" tIns="45720" rIns="91440" bIns="45720" numCol="1" spcCol="0" rtlCol="0" fromWordArt="0" anchor="ctr" anchorCtr="0" forceAA="0" compatLnSpc="1">
+            <a:noAutofit/>
+          </a:bodyPr>
+          <a:lstStyle>
+            <a:defPPr>
+              <a:defRPr lang="en-US"/>
+            </a:defPPr>
+            <a:lvl1pPr marL="0" algn="l" defTabSz="914400" rtl="0" eaLnBrk="1" latinLnBrk="0" hangingPunct="1">
+              <a:defRPr sz="1800" kern="1200">
+                <a:solidFill>
+                  <a:schemeClr val="lt1"/>
+                </a:solidFill>
+                <a:latin typeface="+mn-lt"/>
+                <a:ea typeface="+mn-ea"/>
+                <a:cs typeface="+mn-cs"/>
+              </a:defRPr>
+            </a:lvl1pPr>
+            <a:lvl2pPr marL="457200" algn="l" defTabSz="914400" rtl="0" eaLnBrk="1" latinLnBrk="0" hangingPunct="1">
+              <a:defRPr sz="1800" kern="1200">
+                <a:solidFill>
+                  <a:schemeClr val="lt1"/>
+                </a:solidFill>
+                <a:latin typeface="+mn-lt"/>
+                <a:ea typeface="+mn-ea"/>
+                <a:cs typeface="+mn-cs"/>
+              </a:defRPr>
+            </a:lvl2pPr>
+            <a:lvl3pPr marL="914400" algn="l" defTabSz="914400" rtl="0" eaLnBrk="1" latinLnBrk="0" hangingPunct="1">
+              <a:defRPr sz="1800" kern="1200">
+                <a:solidFill>
+                  <a:schemeClr val="lt1"/>
+                </a:solidFill>
+                <a:latin typeface="+mn-lt"/>
+                <a:ea typeface="+mn-ea"/>
+                <a:cs typeface="+mn-cs"/>
+              </a:defRPr>
+            </a:lvl3pPr>
+            <a:lvl4pPr marL="1371600" algn="l" defTabSz="914400" rtl="0" eaLnBrk="1" latinLnBrk="0" hangingPunct="1">
+              <a:defRPr sz="1800" kern="1200">
+                <a:solidFill>
+                  <a:schemeClr val="lt1"/>
+                </a:solidFill>
+                <a:latin typeface="+mn-lt"/>
+                <a:ea typeface="+mn-ea"/>
+                <a:cs typeface="+mn-cs"/>
+              </a:defRPr>
+            </a:lvl4pPr>
+            <a:lvl5pPr marL="1828800" algn="l" defTabSz="914400" rtl="0" eaLnBrk="1" latinLnBrk="0" hangingPunct="1">
+              <a:defRPr sz="1800" kern="1200">
+                <a:solidFill>
+                  <a:schemeClr val="lt1"/>
+                </a:solidFill>
+                <a:latin typeface="+mn-lt"/>
+                <a:ea typeface="+mn-ea"/>
+                <a:cs typeface="+mn-cs"/>
+              </a:defRPr>
+            </a:lvl5pPr>
+            <a:lvl6pPr marL="2286000" algn="l" defTabSz="914400" rtl="0" eaLnBrk="1" latinLnBrk="0" hangingPunct="1">
+              <a:defRPr sz="1800" kern="1200">
+                <a:solidFill>
+                  <a:schemeClr val="lt1"/>
+                </a:solidFill>
+                <a:latin typeface="+mn-lt"/>
+                <a:ea typeface="+mn-ea"/>
+                <a:cs typeface="+mn-cs"/>
+              </a:defRPr>
+            </a:lvl6pPr>
+            <a:lvl7pPr marL="2743200" algn="l" defTabSz="914400" rtl="0" eaLnBrk="1" latinLnBrk="0" hangingPunct="1">
+              <a:defRPr sz="1800" kern="1200">
+                <a:solidFill>
+                  <a:schemeClr val="lt1"/>
+                </a:solidFill>
+                <a:latin typeface="+mn-lt"/>
+                <a:ea typeface="+mn-ea"/>
+                <a:cs typeface="+mn-cs"/>
+              </a:defRPr>
+            </a:lvl7pPr>
+            <a:lvl8pPr marL="3200400" algn="l" defTabSz="914400" rtl="0" eaLnBrk="1" latinLnBrk="0" hangingPunct="1">
+              <a:defRPr sz="1800" kern="1200">
+                <a:solidFill>
+                  <a:schemeClr val="lt1"/>
+                </a:solidFill>
+                <a:latin typeface="+mn-lt"/>
+                <a:ea typeface="+mn-ea"/>
+                <a:cs typeface="+mn-cs"/>
+              </a:defRPr>
+            </a:lvl8pPr>
+            <a:lvl9pPr marL="3657600" algn="l" defTabSz="914400" rtl="0" eaLnBrk="1" latinLnBrk="0" hangingPunct="1">
+              <a:defRPr sz="1800" kern="1200">
+                <a:solidFill>
+                  <a:schemeClr val="lt1"/>
+                </a:solidFill>
+                <a:latin typeface="+mn-lt"/>
+                <a:ea typeface="+mn-ea"/>
+                <a:cs typeface="+mn-cs"/>
+              </a:defRPr>
+            </a:lvl9pPr>
+          </a:lstStyle>
+          <a:p>
+            <a:pPr algn="ctr"/>
+            <a:endParaRPr lang="en-US"/>
+          </a:p>
+        </p:txBody>
+      </p:sp>
+      <p:sp>
+        <p:nvSpPr>
+          <p:cNvPr id="2" name="Title 1"/>
+          <p:cNvSpPr>
+            <a:spLocks noGrp="1"/>
+          </p:cNvSpPr>
+          <p:nvPr>
+            <p:ph type="title"/>
+          </p:nvPr>
+        </p:nvSpPr>
+        <p:spPr>
+          <a:xfrm>
+            <a:off x="3329250" y="1224709"/>
+            <a:ext cx="8337139" cy="3104284"/>
+          </a:xfrm>
+        </p:spPr>
+        <p:txBody>
+          <a:bodyPr vert="horz" lIns="91440" tIns="45720" rIns="91440" bIns="45720" rtlCol="0" anchor="ctr">
+            <a:normAutofit/>
+          </a:bodyPr>
+          <a:lstStyle/>
+          <a:p>
+            <a:pPr>
+              <a:lnSpc>
+                <a:spcPct val="80000"/>
+              </a:lnSpc>
+            </a:pPr>
+            <a:r>
+              <a:rPr lang="en-US" altLang="zh-CN" sz="9600" dirty="0">
+                <a:blipFill dpi="0" rotWithShape="1">
+                  <a:blip r:embed="rId4"/>
+                  <a:srcRect/>
+                  <a:tile tx="6350" ty="-127000" sx="65000" sy="64000" flip="none" algn="tl"/>
+                </a:blipFill>
+              </a:rPr>
+              <a:t>Questions?</a:t>
+            </a:r>
+            <a:endParaRPr lang="en-US" sz="9600" dirty="0">
+              <a:blipFill dpi="0" rotWithShape="1">
+                <a:blip r:embed="rId4"/>
+                <a:srcRect/>
+                <a:tile tx="6350" ty="-127000" sx="65000" sy="64000" flip="none" algn="tl"/>
+              </a:blipFill>
+            </a:endParaRPr>
+          </a:p>
+        </p:txBody>
+      </p:sp>
+      <p:sp>
+        <p:nvSpPr>
+          <p:cNvPr id="19" name="Rectangle 18"/>
+          <p:cNvSpPr>
+            <a:spLocks noGrp="1" noRot="1" noChangeAspect="1" noMove="1" noResize="1" noEditPoints="1" noAdjustHandles="1" noChangeArrowheads="1" noChangeShapeType="1" noTextEdit="1"/>
+          </p:cNvSpPr>
+          <p:nvPr/>
+        </p:nvSpPr>
+        <p:spPr>
+          <a:xfrm>
+            <a:off x="0" y="4572000"/>
+            <a:ext cx="12192000" cy="2295831"/>
+          </a:xfrm>
+          <a:prstGeom prst="rect">
+            <a:avLst/>
+          </a:prstGeom>
+          <a:blipFill dpi="0" rotWithShape="1">
+            <a:blip r:embed="rId2">
+              <a:alphaModFix amt="85000"/>
+              <a:lum bright="70000" contrast="-70000"/>
+              <a:extLst>
+                <a:ext uri="{28A0092B-C50C-407E-A947-70E740481C1C}">
+                  <a14:useLocalDpi xmlns:a14="http://schemas.microsoft.com/office/drawing/2010/main" val="0"/>
+                </a:ext>
+              </a:extLst>
+            </a:blip>
+            <a:srcRect/>
+            <a:tile tx="0" ty="-704850" sx="92000" sy="89000" flip="xy" algn="ctr"/>
+          </a:blipFill>
+          <a:ln>
+            <a:noFill/>
+          </a:ln>
+        </p:spPr>
+        <p:style>
+          <a:lnRef idx="2">
+            <a:schemeClr val="accent1">
+              <a:shade val="50000"/>
+            </a:schemeClr>
+          </a:lnRef>
+          <a:fillRef idx="1">
+            <a:schemeClr val="accent1"/>
+          </a:fillRef>
+          <a:effectRef idx="0">
+            <a:schemeClr val="accent1"/>
+          </a:effectRef>
+          <a:fontRef idx="minor">
+            <a:schemeClr val="lt1"/>
+          </a:fontRef>
+        </p:style>
+        <p:txBody>
+          <a:bodyPr rtlCol="0" anchor="ctr"/>
+          <a:lstStyle/>
+          <a:p>
+            <a:pPr algn="ctr"/>
+            <a:endParaRPr lang="en-US"/>
+          </a:p>
+        </p:txBody>
+      </p:sp>
+      <p:grpSp>
+        <p:nvGrpSpPr>
+          <p:cNvPr id="21" name="Group 20"/>
+          <p:cNvGrpSpPr>
+            <a:grpSpLocks noGrp="1" noUngrp="1" noRot="1" noChangeAspect="1" noMove="1" noResize="1"/>
+          </p:cNvGrpSpPr>
+          <p:nvPr/>
+        </p:nvGrpSpPr>
+        <p:grpSpPr>
+          <a:xfrm>
+            <a:off x="10245590" y="5111496"/>
+            <a:ext cx="1080904" cy="1080902"/>
+            <a:chOff x="10245590" y="5111496"/>
+            <a:chExt cx="1080904" cy="1080902"/>
+          </a:xfrm>
+        </p:grpSpPr>
+        <p:sp>
+          <p:nvSpPr>
+            <p:cNvPr id="22" name="Oval 21"/>
+            <p:cNvSpPr/>
+            <p:nvPr/>
+          </p:nvSpPr>
+          <p:spPr>
+            <a:xfrm>
+              <a:off x="10245590" y="5111496"/>
+              <a:ext cx="1080904" cy="1080902"/>
+            </a:xfrm>
+            <a:prstGeom prst="ellipse">
+              <a:avLst/>
+            </a:prstGeom>
+            <a:blipFill dpi="0" rotWithShape="1">
+              <a:blip r:embed="rId4">
+                <a:duotone>
+                  <a:schemeClr val="accent1">
+                    <a:shade val="45000"/>
+                    <a:satMod val="135000"/>
+                  </a:schemeClr>
+                  <a:prstClr val="white"/>
+                </a:duotone>
+              </a:blip>
+              <a:srcRect/>
+              <a:tile tx="0" ty="0" sx="85000" sy="85000" flip="none" algn="tl"/>
+            </a:blipFill>
+            <a:ln w="25400" cap="flat" cmpd="sng" algn="ctr">
+              <a:noFill/>
+              <a:prstDash val="solid"/>
+            </a:ln>
+            <a:effectLst/>
+          </p:spPr>
+          <p:txBody>
+            <a:bodyPr lIns="0" tIns="0" rIns="0" bIns="0" rtlCol="0" anchor="ctr"/>
+            <a:lstStyle/>
+            <a:p>
+              <a:pPr marL="0" marR="0" lvl="0" indent="0" algn="ctr" defTabSz="914400" eaLnBrk="1" fontAlgn="auto" latinLnBrk="0" hangingPunct="1">
+                <a:lnSpc>
+                  <a:spcPct val="100000"/>
+                </a:lnSpc>
+                <a:spcBef>
+                  <a:spcPts val="0"/>
+                </a:spcBef>
+                <a:spcAft>
+                  <a:spcPts val="0"/>
+                </a:spcAft>
+                <a:buClrTx/>
+                <a:buSzTx/>
+                <a:buFontTx/>
+                <a:buNone/>
+                <a:defRPr/>
+              </a:pPr>
+              <a:endParaRPr kumimoji="0" lang="en-US" sz="2000" b="0" i="0" u="none" strike="noStrike" kern="0" cap="none" spc="0" normalizeH="0" baseline="0" noProof="0" dirty="0">
+                <a:ln>
+                  <a:noFill/>
+                </a:ln>
+                <a:solidFill>
+                  <a:prstClr val="white"/>
+                </a:solidFill>
+                <a:effectLst/>
+                <a:uLnTx/>
+                <a:uFillTx/>
+                <a:latin typeface="Rockwell Extra Bold" panose="02060903040505020403" pitchFamily="18" charset="0"/>
+                <a:ea typeface="+mn-ea"/>
+                <a:cs typeface="+mn-cs"/>
+              </a:endParaRPr>
+            </a:p>
+          </p:txBody>
+        </p:sp>
+        <p:sp>
+          <p:nvSpPr>
+            <p:cNvPr id="23" name="Oval 22"/>
+            <p:cNvSpPr/>
+            <p:nvPr/>
+          </p:nvSpPr>
+          <p:spPr>
+            <a:xfrm>
+              <a:off x="10353681" y="5219586"/>
+              <a:ext cx="864723" cy="864722"/>
+            </a:xfrm>
+            <a:prstGeom prst="ellipse">
+              <a:avLst/>
+            </a:prstGeom>
+            <a:noFill/>
+            <a:ln w="25400" cap="flat" cmpd="sng" algn="ctr">
+              <a:solidFill>
+                <a:sysClr val="window" lastClr="FFFFFF"/>
+              </a:solidFill>
+              <a:prstDash val="solid"/>
+            </a:ln>
+            <a:effectLst/>
+          </p:spPr>
+          <p:txBody>
+            <a:bodyPr rtlCol="0" anchor="ctr"/>
+            <a:lstStyle/>
+            <a:p>
+              <a:pPr marL="0" marR="0" lvl="0" indent="0" algn="ctr" defTabSz="914400" eaLnBrk="1" fontAlgn="auto" latinLnBrk="0" hangingPunct="1">
+                <a:lnSpc>
+                  <a:spcPct val="100000"/>
+                </a:lnSpc>
+                <a:spcBef>
+                  <a:spcPts val="0"/>
+                </a:spcBef>
+                <a:spcAft>
+                  <a:spcPts val="0"/>
+                </a:spcAft>
+                <a:buClrTx/>
+                <a:buSzTx/>
+                <a:buFontTx/>
+                <a:buNone/>
+                <a:defRPr/>
+              </a:pPr>
+              <a:endParaRPr kumimoji="0" lang="en-US" sz="1800" b="0" i="0" u="none" strike="noStrike" kern="0" cap="none" spc="0" normalizeH="0" baseline="0" noProof="0" dirty="0">
+                <a:ln>
+                  <a:noFill/>
+                </a:ln>
+                <a:solidFill>
+                  <a:prstClr val="white"/>
+                </a:solidFill>
+                <a:effectLst/>
+                <a:uLnTx/>
+                <a:uFillTx/>
+                <a:latin typeface="Calibri" panose="020F0502020204030204"/>
+                <a:ea typeface="+mn-ea"/>
+                <a:cs typeface="+mn-cs"/>
+              </a:endParaRPr>
+            </a:p>
+          </p:txBody>
+        </p:sp>
+      </p:grpSp>
+    </p:spTree>
+    <p:extLst>
+      <p:ext uri="{BB962C8B-B14F-4D97-AF65-F5344CB8AC3E}">
+        <p14:creationId xmlns:p14="http://schemas.microsoft.com/office/powerpoint/2010/main" val="4124708119"/>
+      </p:ext>
+    </p:extLst>
+  </p:cSld>
+  <p:clrMapOvr>
+    <a:masterClrMapping/>
+  </p:clrMapOvr>
+</p:sld>
+</file>
+
+<file path=ppt/slides/slide11.xml><?xml version="1.0" encoding="utf-8"?>
+<p:sld xmlns:a="http://schemas.openxmlformats.org/drawingml/2006/main" xmlns:r="http://schemas.openxmlformats.org/officeDocument/2006/relationships" xmlns:p="http://schemas.openxmlformats.org/presentationml/2006/main">
+  <p:cSld>
     <p:bg>
       <p:bgPr>
         <a:solidFill>
@@ -8467,7 +9154,7 @@
 </p:sld>
 </file>
 
-<file path=ppt/slides/slide11.xml><?xml version="1.0" encoding="utf-8"?>
+<file path=ppt/slides/slide12.xml><?xml version="1.0" encoding="utf-8"?>
 <p:sld xmlns:a="http://schemas.openxmlformats.org/drawingml/2006/main" xmlns:r="http://schemas.openxmlformats.org/officeDocument/2006/relationships" xmlns:p="http://schemas.openxmlformats.org/presentationml/2006/main">
   <p:cSld>
     <p:spTree>
@@ -14144,8 +14831,8 @@
         </p:nvSpPr>
         <p:spPr>
           <a:xfrm>
-            <a:off x="1569971" y="1099602"/>
-            <a:ext cx="8337139" cy="3104284"/>
+            <a:off x="3431527" y="1619250"/>
+            <a:ext cx="5605793" cy="2117318"/>
           </a:xfrm>
         </p:spPr>
         <p:txBody>

</xml_diff>

<commit_message>
update img and pptx
</commit_message>
<xml_diff>
--- a/presentation.pptx
+++ b/presentation.pptx
@@ -18,6 +18,7 @@
     <p:sldId id="265" r:id="rId12"/>
     <p:sldId id="257" r:id="rId13"/>
     <p:sldId id="271" r:id="rId14"/>
+    <p:sldId id="272" r:id="rId15"/>
   </p:sldIdLst>
   <p:sldSz cx="12192000" cy="6858000"/>
   <p:notesSz cx="6858000" cy="9144000"/>
@@ -4043,7 +4044,7 @@
           <a:p>
             <a:fld id="{AEACF533-26F3-064A-A93F-8F02FFC49F4C}" type="datetimeFigureOut">
               <a:rPr lang="en-US" smtClean="0"/>
-              <a:t>4/9/21</a:t>
+              <a:t>4/20/21</a:t>
             </a:fld>
             <a:endParaRPr lang="en-US"/>
           </a:p>
@@ -4215,7 +4216,7 @@
           <a:p>
             <a:fld id="{AEACF533-26F3-064A-A93F-8F02FFC49F4C}" type="datetimeFigureOut">
               <a:rPr lang="en-US" smtClean="0"/>
-              <a:t>4/9/21</a:t>
+              <a:t>4/20/21</a:t>
             </a:fld>
             <a:endParaRPr lang="en-US"/>
           </a:p>
@@ -4390,7 +4391,7 @@
           <a:p>
             <a:fld id="{AEACF533-26F3-064A-A93F-8F02FFC49F4C}" type="datetimeFigureOut">
               <a:rPr lang="en-US" smtClean="0"/>
-              <a:t>4/9/21</a:t>
+              <a:t>4/20/21</a:t>
             </a:fld>
             <a:endParaRPr lang="en-US"/>
           </a:p>
@@ -4555,7 +4556,7 @@
           <a:p>
             <a:fld id="{AEACF533-26F3-064A-A93F-8F02FFC49F4C}" type="datetimeFigureOut">
               <a:rPr lang="en-US" smtClean="0"/>
-              <a:t>4/9/21</a:t>
+              <a:t>4/20/21</a:t>
             </a:fld>
             <a:endParaRPr lang="en-US"/>
           </a:p>
@@ -4871,7 +4872,7 @@
           <a:p>
             <a:fld id="{AEACF533-26F3-064A-A93F-8F02FFC49F4C}" type="datetimeFigureOut">
               <a:rPr lang="en-US" smtClean="0"/>
-              <a:t>4/9/21</a:t>
+              <a:t>4/20/21</a:t>
             </a:fld>
             <a:endParaRPr lang="en-US"/>
           </a:p>
@@ -5324,7 +5325,7 @@
           <a:p>
             <a:fld id="{AEACF533-26F3-064A-A93F-8F02FFC49F4C}" type="datetimeFigureOut">
               <a:rPr lang="en-US" smtClean="0"/>
-              <a:t>4/9/21</a:t>
+              <a:t>4/20/21</a:t>
             </a:fld>
             <a:endParaRPr lang="en-US"/>
           </a:p>
@@ -5730,7 +5731,7 @@
           <a:p>
             <a:fld id="{AEACF533-26F3-064A-A93F-8F02FFC49F4C}" type="datetimeFigureOut">
               <a:rPr lang="en-US" smtClean="0"/>
-              <a:t>4/9/21</a:t>
+              <a:t>4/20/21</a:t>
             </a:fld>
             <a:endParaRPr lang="en-US"/>
           </a:p>
@@ -5843,7 +5844,7 @@
           <a:p>
             <a:fld id="{AEACF533-26F3-064A-A93F-8F02FFC49F4C}" type="datetimeFigureOut">
               <a:rPr lang="en-US" smtClean="0"/>
-              <a:t>4/9/21</a:t>
+              <a:t>4/20/21</a:t>
             </a:fld>
             <a:endParaRPr lang="en-US"/>
           </a:p>
@@ -5955,7 +5956,7 @@
           <a:p>
             <a:fld id="{AEACF533-26F3-064A-A93F-8F02FFC49F4C}" type="datetimeFigureOut">
               <a:rPr lang="en-US" smtClean="0"/>
-              <a:t>4/9/21</a:t>
+              <a:t>4/20/21</a:t>
             </a:fld>
             <a:endParaRPr lang="en-US"/>
           </a:p>
@@ -6308,7 +6309,7 @@
           <a:p>
             <a:fld id="{AEACF533-26F3-064A-A93F-8F02FFC49F4C}" type="datetimeFigureOut">
               <a:rPr lang="en-US" smtClean="0"/>
-              <a:t>4/9/21</a:t>
+              <a:t>4/20/21</a:t>
             </a:fld>
             <a:endParaRPr lang="en-US"/>
           </a:p>
@@ -6808,7 +6809,7 @@
           <a:p>
             <a:fld id="{AEACF533-26F3-064A-A93F-8F02FFC49F4C}" type="datetimeFigureOut">
               <a:rPr lang="en-US" smtClean="0"/>
-              <a:t>4/9/21</a:t>
+              <a:t>4/20/21</a:t>
             </a:fld>
             <a:endParaRPr lang="en-US"/>
           </a:p>
@@ -7156,7 +7157,7 @@
           <a:p>
             <a:fld id="{AEACF533-26F3-064A-A93F-8F02FFC49F4C}" type="datetimeFigureOut">
               <a:rPr lang="en-US" smtClean="0"/>
-              <a:t>4/9/21</a:t>
+              <a:t>4/20/21</a:t>
             </a:fld>
             <a:endParaRPr lang="en-US"/>
           </a:p>
@@ -14116,6 +14117,530 @@
 </p:sld>
 </file>
 
+<file path=ppt/slides/slide14.xml><?xml version="1.0" encoding="utf-8"?>
+<p:sld xmlns:a="http://schemas.openxmlformats.org/drawingml/2006/main" xmlns:r="http://schemas.openxmlformats.org/officeDocument/2006/relationships" xmlns:p="http://schemas.openxmlformats.org/presentationml/2006/main">
+  <p:cSld>
+    <p:spTree>
+      <p:nvGrpSpPr>
+        <p:cNvPr id="1" name=""/>
+        <p:cNvGrpSpPr/>
+        <p:nvPr/>
+      </p:nvGrpSpPr>
+      <p:grpSpPr>
+        <a:xfrm>
+          <a:off x="0" y="0"/>
+          <a:ext cx="0" cy="0"/>
+          <a:chOff x="0" y="0"/>
+          <a:chExt cx="0" cy="0"/>
+        </a:xfrm>
+      </p:grpSpPr>
+      <p:sp>
+        <p:nvSpPr>
+          <p:cNvPr id="4" name="Rectangle 3">
+            <a:extLst>
+              <a:ext uri="{FF2B5EF4-FFF2-40B4-BE49-F238E27FC236}">
+                <a16:creationId xmlns:a16="http://schemas.microsoft.com/office/drawing/2014/main" id="{1005F11E-BC37-4E44-9181-46A559DA91DC}"/>
+              </a:ext>
+            </a:extLst>
+          </p:cNvPr>
+          <p:cNvSpPr/>
+          <p:nvPr/>
+        </p:nvSpPr>
+        <p:spPr>
+          <a:xfrm>
+            <a:off x="4667086" y="2603740"/>
+            <a:ext cx="2033518" cy="709086"/>
+          </a:xfrm>
+          <a:prstGeom prst="rect">
+            <a:avLst/>
+          </a:prstGeom>
+          <a:solidFill>
+            <a:schemeClr val="accent4">
+              <a:lumMod val="60000"/>
+              <a:lumOff val="40000"/>
+            </a:schemeClr>
+          </a:solidFill>
+          <a:ln>
+            <a:solidFill>
+              <a:schemeClr val="accent4">
+                <a:lumMod val="75000"/>
+              </a:schemeClr>
+            </a:solidFill>
+          </a:ln>
+        </p:spPr>
+        <p:style>
+          <a:lnRef idx="2">
+            <a:schemeClr val="accent1">
+              <a:shade val="50000"/>
+            </a:schemeClr>
+          </a:lnRef>
+          <a:fillRef idx="1">
+            <a:schemeClr val="accent1"/>
+          </a:fillRef>
+          <a:effectRef idx="0">
+            <a:schemeClr val="accent1"/>
+          </a:effectRef>
+          <a:fontRef idx="minor">
+            <a:schemeClr val="lt1"/>
+          </a:fontRef>
+        </p:style>
+        <p:txBody>
+          <a:bodyPr rtlCol="0" anchor="ctr"/>
+          <a:lstStyle/>
+          <a:p>
+            <a:pPr algn="ctr"/>
+            <a:r>
+              <a:rPr lang="en-US" altLang="zh-CN" dirty="0">
+                <a:solidFill>
+                  <a:schemeClr val="tx1"/>
+                </a:solidFill>
+              </a:rPr>
+              <a:t>Seq2Seq</a:t>
+            </a:r>
+            <a:r>
+              <a:rPr lang="zh-CN" altLang="en-US" dirty="0">
+                <a:solidFill>
+                  <a:schemeClr val="tx1"/>
+                </a:solidFill>
+              </a:rPr>
+              <a:t> </a:t>
+            </a:r>
+            <a:r>
+              <a:rPr lang="en-US" altLang="zh-CN" dirty="0">
+                <a:solidFill>
+                  <a:schemeClr val="tx1"/>
+                </a:solidFill>
+              </a:rPr>
+              <a:t>model</a:t>
+            </a:r>
+            <a:endParaRPr lang="en-US" dirty="0">
+              <a:solidFill>
+                <a:schemeClr val="tx1"/>
+              </a:solidFill>
+            </a:endParaRPr>
+          </a:p>
+        </p:txBody>
+      </p:sp>
+      <p:sp>
+        <p:nvSpPr>
+          <p:cNvPr id="6" name="Rectangle 5">
+            <a:extLst>
+              <a:ext uri="{FF2B5EF4-FFF2-40B4-BE49-F238E27FC236}">
+                <a16:creationId xmlns:a16="http://schemas.microsoft.com/office/drawing/2014/main" id="{F35B2EA0-579B-B44C-8898-05D03CEDCBF7}"/>
+              </a:ext>
+            </a:extLst>
+          </p:cNvPr>
+          <p:cNvSpPr/>
+          <p:nvPr/>
+        </p:nvSpPr>
+        <p:spPr>
+          <a:xfrm>
+            <a:off x="7012554" y="2603740"/>
+            <a:ext cx="1558830" cy="709086"/>
+          </a:xfrm>
+          <a:prstGeom prst="rect">
+            <a:avLst/>
+          </a:prstGeom>
+          <a:solidFill>
+            <a:schemeClr val="accent4">
+              <a:lumMod val="60000"/>
+              <a:lumOff val="40000"/>
+            </a:schemeClr>
+          </a:solidFill>
+          <a:ln>
+            <a:solidFill>
+              <a:schemeClr val="accent4">
+                <a:lumMod val="75000"/>
+              </a:schemeClr>
+            </a:solidFill>
+          </a:ln>
+        </p:spPr>
+        <p:style>
+          <a:lnRef idx="2">
+            <a:schemeClr val="accent1">
+              <a:shade val="50000"/>
+            </a:schemeClr>
+          </a:lnRef>
+          <a:fillRef idx="1">
+            <a:schemeClr val="accent1"/>
+          </a:fillRef>
+          <a:effectRef idx="0">
+            <a:schemeClr val="accent1"/>
+          </a:effectRef>
+          <a:fontRef idx="minor">
+            <a:schemeClr val="lt1"/>
+          </a:fontRef>
+        </p:style>
+        <p:txBody>
+          <a:bodyPr rtlCol="0" anchor="ctr"/>
+          <a:lstStyle/>
+          <a:p>
+            <a:pPr algn="ctr"/>
+            <a:r>
+              <a:rPr lang="en-US" altLang="zh-CN" dirty="0">
+                <a:solidFill>
+                  <a:schemeClr val="tx1"/>
+                </a:solidFill>
+              </a:rPr>
+              <a:t>Predictions</a:t>
+            </a:r>
+            <a:endParaRPr lang="en-US" dirty="0">
+              <a:solidFill>
+                <a:schemeClr val="tx1"/>
+              </a:solidFill>
+            </a:endParaRPr>
+          </a:p>
+        </p:txBody>
+      </p:sp>
+      <p:grpSp>
+        <p:nvGrpSpPr>
+          <p:cNvPr id="20" name="Group 19">
+            <a:extLst>
+              <a:ext uri="{FF2B5EF4-FFF2-40B4-BE49-F238E27FC236}">
+                <a16:creationId xmlns:a16="http://schemas.microsoft.com/office/drawing/2014/main" id="{27CF5F9F-E29D-6D49-981D-7F638E1570AC}"/>
+              </a:ext>
+            </a:extLst>
+          </p:cNvPr>
+          <p:cNvGrpSpPr/>
+          <p:nvPr/>
+        </p:nvGrpSpPr>
+        <p:grpSpPr>
+          <a:xfrm>
+            <a:off x="2975509" y="2609507"/>
+            <a:ext cx="1386443" cy="1343573"/>
+            <a:chOff x="2570960" y="2603740"/>
+            <a:chExt cx="1386443" cy="1343573"/>
+          </a:xfrm>
+        </p:grpSpPr>
+        <p:sp>
+          <p:nvSpPr>
+            <p:cNvPr id="5" name="Rectangle 4">
+              <a:extLst>
+                <a:ext uri="{FF2B5EF4-FFF2-40B4-BE49-F238E27FC236}">
+                  <a16:creationId xmlns:a16="http://schemas.microsoft.com/office/drawing/2014/main" id="{FBC25042-A74D-0640-A956-EBDB924B314B}"/>
+                </a:ext>
+              </a:extLst>
+            </p:cNvPr>
+            <p:cNvSpPr/>
+            <p:nvPr/>
+          </p:nvSpPr>
+          <p:spPr>
+            <a:xfrm>
+              <a:off x="2570960" y="2603740"/>
+              <a:ext cx="1386443" cy="709086"/>
+            </a:xfrm>
+            <a:prstGeom prst="rect">
+              <a:avLst/>
+            </a:prstGeom>
+            <a:solidFill>
+              <a:schemeClr val="accent4">
+                <a:lumMod val="60000"/>
+                <a:lumOff val="40000"/>
+              </a:schemeClr>
+            </a:solidFill>
+            <a:ln>
+              <a:solidFill>
+                <a:schemeClr val="accent4">
+                  <a:lumMod val="75000"/>
+                </a:schemeClr>
+              </a:solidFill>
+            </a:ln>
+          </p:spPr>
+          <p:style>
+            <a:lnRef idx="2">
+              <a:schemeClr val="accent1">
+                <a:shade val="50000"/>
+              </a:schemeClr>
+            </a:lnRef>
+            <a:fillRef idx="1">
+              <a:schemeClr val="accent1"/>
+            </a:fillRef>
+            <a:effectRef idx="0">
+              <a:schemeClr val="accent1"/>
+            </a:effectRef>
+            <a:fontRef idx="minor">
+              <a:schemeClr val="lt1"/>
+            </a:fontRef>
+          </p:style>
+          <p:txBody>
+            <a:bodyPr rtlCol="0" anchor="ctr"/>
+            <a:lstStyle/>
+            <a:p>
+              <a:pPr algn="ctr"/>
+              <a:r>
+                <a:rPr lang="en-US" altLang="zh-CN" dirty="0">
+                  <a:solidFill>
+                    <a:schemeClr val="tx1"/>
+                  </a:solidFill>
+                </a:rPr>
+                <a:t>PCs</a:t>
+              </a:r>
+              <a:endParaRPr lang="en-US" dirty="0">
+                <a:solidFill>
+                  <a:schemeClr val="tx1"/>
+                </a:solidFill>
+              </a:endParaRPr>
+            </a:p>
+          </p:txBody>
+        </p:sp>
+        <p:cxnSp>
+          <p:nvCxnSpPr>
+            <p:cNvPr id="8" name="Straight Connector 7">
+              <a:extLst>
+                <a:ext uri="{FF2B5EF4-FFF2-40B4-BE49-F238E27FC236}">
+                  <a16:creationId xmlns:a16="http://schemas.microsoft.com/office/drawing/2014/main" id="{58105FB4-C34E-2246-A768-1E0373FD8314}"/>
+                </a:ext>
+              </a:extLst>
+            </p:cNvPr>
+            <p:cNvCxnSpPr/>
+            <p:nvPr/>
+          </p:nvCxnSpPr>
+          <p:spPr>
+            <a:xfrm>
+              <a:off x="2570960" y="3312826"/>
+              <a:ext cx="0" cy="344774"/>
+            </a:xfrm>
+            <a:prstGeom prst="line">
+              <a:avLst/>
+            </a:prstGeom>
+            <a:ln w="19050"/>
+          </p:spPr>
+          <p:style>
+            <a:lnRef idx="1">
+              <a:schemeClr val="accent2"/>
+            </a:lnRef>
+            <a:fillRef idx="0">
+              <a:schemeClr val="accent2"/>
+            </a:fillRef>
+            <a:effectRef idx="0">
+              <a:schemeClr val="accent2"/>
+            </a:effectRef>
+            <a:fontRef idx="minor">
+              <a:schemeClr val="tx1"/>
+            </a:fontRef>
+          </p:style>
+        </p:cxnSp>
+        <p:cxnSp>
+          <p:nvCxnSpPr>
+            <p:cNvPr id="9" name="Straight Connector 8">
+              <a:extLst>
+                <a:ext uri="{FF2B5EF4-FFF2-40B4-BE49-F238E27FC236}">
+                  <a16:creationId xmlns:a16="http://schemas.microsoft.com/office/drawing/2014/main" id="{097EC529-034C-A94D-8D5F-688459541B4D}"/>
+                </a:ext>
+              </a:extLst>
+            </p:cNvPr>
+            <p:cNvCxnSpPr/>
+            <p:nvPr/>
+          </p:nvCxnSpPr>
+          <p:spPr>
+            <a:xfrm>
+              <a:off x="3957403" y="3312826"/>
+              <a:ext cx="0" cy="344774"/>
+            </a:xfrm>
+            <a:prstGeom prst="line">
+              <a:avLst/>
+            </a:prstGeom>
+            <a:ln w="19050"/>
+          </p:spPr>
+          <p:style>
+            <a:lnRef idx="1">
+              <a:schemeClr val="accent2"/>
+            </a:lnRef>
+            <a:fillRef idx="0">
+              <a:schemeClr val="accent2"/>
+            </a:fillRef>
+            <a:effectRef idx="0">
+              <a:schemeClr val="accent2"/>
+            </a:effectRef>
+            <a:fontRef idx="minor">
+              <a:schemeClr val="tx1"/>
+            </a:fontRef>
+          </p:style>
+        </p:cxnSp>
+        <p:cxnSp>
+          <p:nvCxnSpPr>
+            <p:cNvPr id="11" name="Straight Arrow Connector 10">
+              <a:extLst>
+                <a:ext uri="{FF2B5EF4-FFF2-40B4-BE49-F238E27FC236}">
+                  <a16:creationId xmlns:a16="http://schemas.microsoft.com/office/drawing/2014/main" id="{E73C5EAC-06DE-B041-B7F5-F841B3FAE5C1}"/>
+                </a:ext>
+              </a:extLst>
+            </p:cNvPr>
+            <p:cNvCxnSpPr>
+              <a:cxnSpLocks/>
+            </p:cNvCxnSpPr>
+            <p:nvPr/>
+          </p:nvCxnSpPr>
+          <p:spPr>
+            <a:xfrm>
+              <a:off x="2570960" y="3537736"/>
+              <a:ext cx="1386443" cy="0"/>
+            </a:xfrm>
+            <a:prstGeom prst="straightConnector1">
+              <a:avLst/>
+            </a:prstGeom>
+            <a:ln w="19050">
+              <a:headEnd type="triangle"/>
+              <a:tailEnd type="triangle"/>
+            </a:ln>
+          </p:spPr>
+          <p:style>
+            <a:lnRef idx="1">
+              <a:schemeClr val="dk1"/>
+            </a:lnRef>
+            <a:fillRef idx="0">
+              <a:schemeClr val="dk1"/>
+            </a:fillRef>
+            <a:effectRef idx="0">
+              <a:schemeClr val="dk1"/>
+            </a:effectRef>
+            <a:fontRef idx="minor">
+              <a:schemeClr val="tx1"/>
+            </a:fontRef>
+          </p:style>
+        </p:cxnSp>
+        <p:sp>
+          <p:nvSpPr>
+            <p:cNvPr id="12" name="TextBox 11">
+              <a:extLst>
+                <a:ext uri="{FF2B5EF4-FFF2-40B4-BE49-F238E27FC236}">
+                  <a16:creationId xmlns:a16="http://schemas.microsoft.com/office/drawing/2014/main" id="{F33F4666-67AE-4548-ABE8-4C3A9BAA45D9}"/>
+                </a:ext>
+              </a:extLst>
+            </p:cNvPr>
+            <p:cNvSpPr txBox="1"/>
+            <p:nvPr/>
+          </p:nvSpPr>
+          <p:spPr>
+            <a:xfrm>
+              <a:off x="3020364" y="3577981"/>
+              <a:ext cx="487634" cy="369332"/>
+            </a:xfrm>
+            <a:prstGeom prst="rect">
+              <a:avLst/>
+            </a:prstGeom>
+            <a:noFill/>
+          </p:spPr>
+          <p:txBody>
+            <a:bodyPr wrap="none" rtlCol="0">
+              <a:spAutoFit/>
+            </a:bodyPr>
+            <a:lstStyle/>
+            <a:p>
+              <a:r>
+                <a:rPr lang="en-US" altLang="zh-CN" dirty="0"/>
+                <a:t>IW</a:t>
+              </a:r>
+              <a:endParaRPr lang="en-US" dirty="0"/>
+            </a:p>
+          </p:txBody>
+        </p:sp>
+      </p:grpSp>
+      <p:cxnSp>
+        <p:nvCxnSpPr>
+          <p:cNvPr id="14" name="Straight Arrow Connector 13">
+            <a:extLst>
+              <a:ext uri="{FF2B5EF4-FFF2-40B4-BE49-F238E27FC236}">
+                <a16:creationId xmlns:a16="http://schemas.microsoft.com/office/drawing/2014/main" id="{20F696BF-D4DA-E042-BC45-81E2E153DBF9}"/>
+              </a:ext>
+            </a:extLst>
+          </p:cNvPr>
+          <p:cNvCxnSpPr>
+            <a:cxnSpLocks/>
+            <a:stCxn id="5" idx="3"/>
+            <a:endCxn id="4" idx="1"/>
+          </p:cNvCxnSpPr>
+          <p:nvPr/>
+        </p:nvCxnSpPr>
+        <p:spPr>
+          <a:xfrm flipV="1">
+            <a:off x="4361952" y="2958283"/>
+            <a:ext cx="305134" cy="5767"/>
+          </a:xfrm>
+          <a:prstGeom prst="straightConnector1">
+            <a:avLst/>
+          </a:prstGeom>
+          <a:ln w="25400">
+            <a:solidFill>
+              <a:schemeClr val="accent3"/>
+            </a:solidFill>
+            <a:tailEnd type="triangle"/>
+          </a:ln>
+        </p:spPr>
+        <p:style>
+          <a:lnRef idx="1">
+            <a:schemeClr val="accent1"/>
+          </a:lnRef>
+          <a:fillRef idx="0">
+            <a:schemeClr val="accent1"/>
+          </a:fillRef>
+          <a:effectRef idx="0">
+            <a:schemeClr val="accent1"/>
+          </a:effectRef>
+          <a:fontRef idx="minor">
+            <a:schemeClr val="tx1"/>
+          </a:fontRef>
+        </p:style>
+      </p:cxnSp>
+      <p:cxnSp>
+        <p:nvCxnSpPr>
+          <p:cNvPr id="16" name="Straight Arrow Connector 15">
+            <a:extLst>
+              <a:ext uri="{FF2B5EF4-FFF2-40B4-BE49-F238E27FC236}">
+                <a16:creationId xmlns:a16="http://schemas.microsoft.com/office/drawing/2014/main" id="{789AAAB9-52B8-344A-8AF1-2E4391FDC676}"/>
+              </a:ext>
+            </a:extLst>
+          </p:cNvPr>
+          <p:cNvCxnSpPr>
+            <a:cxnSpLocks/>
+            <a:stCxn id="4" idx="3"/>
+            <a:endCxn id="6" idx="1"/>
+          </p:cNvCxnSpPr>
+          <p:nvPr/>
+        </p:nvCxnSpPr>
+        <p:spPr>
+          <a:xfrm>
+            <a:off x="6700604" y="2958283"/>
+            <a:ext cx="311950" cy="0"/>
+          </a:xfrm>
+          <a:prstGeom prst="straightConnector1">
+            <a:avLst/>
+          </a:prstGeom>
+          <a:ln w="25400">
+            <a:solidFill>
+              <a:schemeClr val="accent2"/>
+            </a:solidFill>
+            <a:tailEnd type="triangle"/>
+          </a:ln>
+        </p:spPr>
+        <p:style>
+          <a:lnRef idx="1">
+            <a:schemeClr val="accent1"/>
+          </a:lnRef>
+          <a:fillRef idx="0">
+            <a:schemeClr val="accent1"/>
+          </a:fillRef>
+          <a:effectRef idx="0">
+            <a:schemeClr val="accent1"/>
+          </a:effectRef>
+          <a:fontRef idx="minor">
+            <a:schemeClr val="tx1"/>
+          </a:fontRef>
+        </p:style>
+      </p:cxnSp>
+    </p:spTree>
+    <p:extLst>
+      <p:ext uri="{BB962C8B-B14F-4D97-AF65-F5344CB8AC3E}">
+        <p14:creationId xmlns:p14="http://schemas.microsoft.com/office/powerpoint/2010/main" val="510774938"/>
+      </p:ext>
+    </p:extLst>
+  </p:cSld>
+  <p:clrMapOvr>
+    <a:masterClrMapping/>
+  </p:clrMapOvr>
+</p:sld>
+</file>
+
 <file path=ppt/slides/slide2.xml><?xml version="1.0" encoding="utf-8"?>
 <p:sld xmlns:a="http://schemas.openxmlformats.org/drawingml/2006/main" xmlns:r="http://schemas.openxmlformats.org/officeDocument/2006/relationships" xmlns:p="http://schemas.openxmlformats.org/presentationml/2006/main">
   <p:cSld>

</xml_diff>